<commit_message>
updates to m1 slide deck & project readme for new m4 module on o365 apis
</commit_message>
<xml_diff>
--- a/01.Introduction to the Day/Introduction to the Day.pptx
+++ b/01.Introduction to the Day/Introduction to the Day.pptx
@@ -402,7 +402,7 @@
           <a:p>
             <a:fld id="{DE219B1A-AE41-483B-A766-69B9363DDA6A}" type="datetimeFigureOut">
               <a:rPr lang="en-US" smtClean="0"/>
-              <a:t>10/24/2014</a:t>
+              <a:t>10/27/2014</a:t>
             </a:fld>
             <a:endParaRPr lang="en-US"/>
           </a:p>
@@ -684,7 +684,7 @@
           <a:p>
             <a:fld id="{D51B1278-D92B-4AF3-A9C1-71DD298190CE}" type="datetimeFigureOut">
               <a:rPr lang="en-US" smtClean="0"/>
-              <a:t>10/24/2014</a:t>
+              <a:t>10/27/2014</a:t>
             </a:fld>
             <a:endParaRPr lang="en-US"/>
           </a:p>
@@ -1398,7 +1398,7 @@
                 </a:solidFill>
               </a:rPr>
               <a:pPr/>
-              <a:t>10/24/2014</a:t>
+              <a:t>10/27/2014</a:t>
             </a:fld>
             <a:endParaRPr lang="en-US">
               <a:solidFill>
@@ -1630,7 +1630,7 @@
           <a:p>
             <a:fld id="{D31E4894-7650-4412-ACB8-29465F440D88}" type="datetime1">
               <a:rPr lang="en-US" smtClean="0"/>
-              <a:t>10/24/2014</a:t>
+              <a:t>10/27/2014</a:t>
             </a:fld>
             <a:endParaRPr lang="en-US" dirty="0"/>
           </a:p>
@@ -1866,7 +1866,7 @@
                 </a:solidFill>
               </a:rPr>
               <a:pPr/>
-              <a:t>10/24/2014</a:t>
+              <a:t>10/27/2014</a:t>
             </a:fld>
             <a:endParaRPr lang="en-US">
               <a:solidFill>
@@ -2098,7 +2098,7 @@
           <a:p>
             <a:fld id="{13E92F52-F2C6-4745-BBDE-E5EE0DA70D4E}" type="datetime1">
               <a:rPr lang="en-US" smtClean="0"/>
-              <a:t>10/24/2014</a:t>
+              <a:t>10/27/2014</a:t>
             </a:fld>
             <a:endParaRPr lang="en-US" dirty="0"/>
           </a:p>
@@ -2240,7 +2240,7 @@
           <a:p>
             <a:fld id="{D51B1278-D92B-4AF3-A9C1-71DD298190CE}" type="datetimeFigureOut">
               <a:rPr lang="en-US" smtClean="0"/>
-              <a:t>10/24/2014</a:t>
+              <a:t>10/27/2014</a:t>
             </a:fld>
             <a:endParaRPr lang="en-US"/>
           </a:p>
@@ -2462,7 +2462,7 @@
           <a:p>
             <a:fld id="{D51B1278-D92B-4AF3-A9C1-71DD298190CE}" type="datetimeFigureOut">
               <a:rPr lang="en-US" smtClean="0"/>
-              <a:t>10/24/2014</a:t>
+              <a:t>10/27/2014</a:t>
             </a:fld>
             <a:endParaRPr lang="en-US"/>
           </a:p>
@@ -2699,7 +2699,7 @@
           <a:p>
             <a:fld id="{DBC13BCB-57C4-454F-8C02-26BDCE1A7007}" type="datetime1">
               <a:rPr lang="en-US" smtClean="0"/>
-              <a:t>10/24/2014</a:t>
+              <a:t>10/27/2014</a:t>
             </a:fld>
             <a:endParaRPr lang="en-US"/>
           </a:p>
@@ -2939,7 +2939,7 @@
           <a:p>
             <a:fld id="{4158D9CF-52ED-4C2B-9870-3BEFB23E0EBC}" type="datetime1">
               <a:rPr lang="en-US" smtClean="0"/>
-              <a:t>10/24/2014</a:t>
+              <a:t>10/27/2014</a:t>
             </a:fld>
             <a:endParaRPr lang="en-US" dirty="0"/>
           </a:p>
@@ -3109,7 +3109,7 @@
           <a:p>
             <a:fld id="{D51B1278-D92B-4AF3-A9C1-71DD298190CE}" type="datetimeFigureOut">
               <a:rPr lang="en-US" smtClean="0"/>
-              <a:t>10/24/2014</a:t>
+              <a:t>10/27/2014</a:t>
             </a:fld>
             <a:endParaRPr lang="en-US"/>
           </a:p>
@@ -3363,7 +3363,7 @@
           <a:p>
             <a:fld id="{D51B1278-D92B-4AF3-A9C1-71DD298190CE}" type="datetimeFigureOut">
               <a:rPr lang="en-US" smtClean="0"/>
-              <a:t>10/24/2014</a:t>
+              <a:t>10/27/2014</a:t>
             </a:fld>
             <a:endParaRPr lang="en-US"/>
           </a:p>
@@ -3628,7 +3628,7 @@
           <a:p>
             <a:fld id="{B079C3B8-7366-4A44-A34B-3977080C19E7}" type="datetime1">
               <a:rPr lang="en-US" smtClean="0"/>
-              <a:t>10/24/2014</a:t>
+              <a:t>10/27/2014</a:t>
             </a:fld>
             <a:endParaRPr lang="en-US" dirty="0"/>
           </a:p>
@@ -3738,33 +3738,6 @@
           <a:bodyPr/>
           <a:lstStyle/>
           <a:p>
-            <a:pPr marL="0" marR="0" indent="0" algn="l" defTabSz="914185" rtl="0" eaLnBrk="1" fontAlgn="auto" latinLnBrk="0" hangingPunct="1">
-              <a:lnSpc>
-                <a:spcPct val="90000"/>
-              </a:lnSpc>
-              <a:spcBef>
-                <a:spcPts val="0"/>
-              </a:spcBef>
-              <a:spcAft>
-                <a:spcPts val="333"/>
-              </a:spcAft>
-              <a:buClrTx/>
-              <a:buSzTx/>
-              <a:buFontTx/>
-              <a:buNone/>
-              <a:tabLst/>
-              <a:defRPr/>
-            </a:pPr>
-            <a:r>
-              <a:rPr lang="en-US" baseline="0" dirty="0" smtClean="0"/>
-              <a:t>See the demo script /demos/script-module04.md for instructions</a:t>
-            </a:r>
-            <a:endParaRPr lang="en-US" dirty="0" smtClean="0"/>
-          </a:p>
-          <a:p>
-            <a:endParaRPr lang="en-US" dirty="0" smtClean="0"/>
-          </a:p>
-          <a:p>
             <a:r>
               <a:rPr lang="en-US" dirty="0" smtClean="0"/>
               <a:t>This demo shows the final solution built in module 4. </a:t>
@@ -3803,7 +3776,7 @@
           <a:p>
             <a:fld id="{D51B1278-D92B-4AF3-A9C1-71DD298190CE}" type="datetimeFigureOut">
               <a:rPr lang="en-US" smtClean="0"/>
-              <a:t>10/24/2014</a:t>
+              <a:t>10/27/2014</a:t>
             </a:fld>
             <a:endParaRPr lang="en-US"/>
           </a:p>
@@ -4053,7 +4026,7 @@
           <a:p>
             <a:fld id="{D51B1278-D92B-4AF3-A9C1-71DD298190CE}" type="datetimeFigureOut">
               <a:rPr lang="en-US" smtClean="0"/>
-              <a:t>10/24/2014</a:t>
+              <a:t>10/27/2014</a:t>
             </a:fld>
             <a:endParaRPr lang="en-US"/>
           </a:p>
@@ -4318,7 +4291,7 @@
           <a:p>
             <a:fld id="{B079C3B8-7366-4A44-A34B-3977080C19E7}" type="datetime1">
               <a:rPr lang="en-US" smtClean="0"/>
-              <a:t>10/24/2014</a:t>
+              <a:t>10/27/2014</a:t>
             </a:fld>
             <a:endParaRPr lang="en-US" dirty="0"/>
           </a:p>
@@ -4565,7 +4538,7 @@
           <a:p>
             <a:fld id="{0BB6559B-C68D-49B4-97AE-9BB74C417927}" type="datetime1">
               <a:rPr lang="en-US" smtClean="0"/>
-              <a:t>10/24/2014</a:t>
+              <a:t>10/27/2014</a:t>
             </a:fld>
             <a:endParaRPr lang="en-US"/>
           </a:p>
@@ -4799,7 +4772,7 @@
           <a:p>
             <a:fld id="{3DE98D88-4B2E-4AAB-9ECA-CFD46E198059}" type="datetime1">
               <a:rPr lang="en-US" smtClean="0"/>
-              <a:t>10/24/2014</a:t>
+              <a:t>10/27/2014</a:t>
             </a:fld>
             <a:endParaRPr lang="en-US" dirty="0"/>
           </a:p>
@@ -5125,7 +5098,7 @@
           <a:p>
             <a:fld id="{D51B1278-D92B-4AF3-A9C1-71DD298190CE}" type="datetimeFigureOut">
               <a:rPr lang="en-US" smtClean="0"/>
-              <a:t>10/24/2014</a:t>
+              <a:t>10/27/2014</a:t>
             </a:fld>
             <a:endParaRPr lang="en-US"/>
           </a:p>
@@ -5763,7 +5736,7 @@
                 </a:solidFill>
               </a:rPr>
               <a:pPr/>
-              <a:t>10/24/2014</a:t>
+              <a:t>10/27/2014</a:t>
             </a:fld>
             <a:endParaRPr lang="en-US">
               <a:solidFill>
@@ -6004,7 +5977,7 @@
           <a:p>
             <a:fld id="{3B7A2A12-E0E2-4D2C-A6ED-C38FD9033759}" type="datetime1">
               <a:rPr lang="en-US" smtClean="0"/>
-              <a:t>10/24/2014</a:t>
+              <a:t>10/27/2014</a:t>
             </a:fld>
             <a:endParaRPr lang="en-US" dirty="0"/>
           </a:p>
@@ -17844,7 +17817,7 @@
           </a:effectLst>
           <a:extLst>
             <a:ext uri="{909E8E84-426E-40dd-AFC4-6F175D3DCCD1}">
-              <a14:hiddenFill xmlns:a14="http://schemas.microsoft.com/office/drawing/2010/main" xmlns="">
+              <a14:hiddenFill xmlns="" xmlns:a14="http://schemas.microsoft.com/office/drawing/2010/main">
                 <a:solidFill>
                   <a:srgbClr val="FFFFFF"/>
                 </a:solidFill>
@@ -17947,7 +17920,7 @@
           <a:noFill/>
           <a:extLst>
             <a:ext uri="{909E8E84-426E-40dd-AFC4-6F175D3DCCD1}">
-              <a14:hiddenFill xmlns:a14="http://schemas.microsoft.com/office/drawing/2010/main" xmlns="">
+              <a14:hiddenFill xmlns="" xmlns:a14="http://schemas.microsoft.com/office/drawing/2010/main">
                 <a:solidFill>
                   <a:srgbClr val="FFFFFF"/>
                 </a:solidFill>
@@ -22115,7 +22088,7 @@
           </a:effectLst>
           <a:extLst>
             <a:ext uri="{909E8E84-426E-40dd-AFC4-6F175D3DCCD1}">
-              <a14:hiddenFill xmlns:a14="http://schemas.microsoft.com/office/drawing/2010/main" xmlns="">
+              <a14:hiddenFill xmlns="" xmlns:a14="http://schemas.microsoft.com/office/drawing/2010/main">
                 <a:solidFill>
                   <a:schemeClr val="accent1"/>
                 </a:solidFill>
@@ -24365,7 +24338,7 @@
                 <a:gridCol w="11225057">
                   <a:extLst>
                     <a:ext uri="{9D8B030D-6E8A-4147-A177-3AD203B41FA5}">
-                      <a16:colId xmlns:a16="http://schemas.microsoft.com/office/drawing/2014/main" xmlns="" val="1253488153"/>
+                      <a16:colId xmlns="" xmlns:a16="http://schemas.microsoft.com/office/drawing/2014/main" val="1253488153"/>
                     </a:ext>
                   </a:extLst>
                 </a:gridCol>
@@ -24387,7 +24360,7 @@
                 </a:tc>
                 <a:extLst>
                   <a:ext uri="{0D108BD9-81ED-4DB2-BD59-A6C34878D82A}">
-                    <a16:rowId xmlns:a16="http://schemas.microsoft.com/office/drawing/2014/main" xmlns="" val="829859176"/>
+                    <a16:rowId xmlns="" xmlns:a16="http://schemas.microsoft.com/office/drawing/2014/main" val="829859176"/>
                   </a:ext>
                 </a:extLst>
               </a:tr>
@@ -24407,7 +24380,7 @@
                 </a:tc>
                 <a:extLst>
                   <a:ext uri="{0D108BD9-81ED-4DB2-BD59-A6C34878D82A}">
-                    <a16:rowId xmlns:a16="http://schemas.microsoft.com/office/drawing/2014/main" xmlns="" val="1946132611"/>
+                    <a16:rowId xmlns="" xmlns:a16="http://schemas.microsoft.com/office/drawing/2014/main" val="1946132611"/>
                   </a:ext>
                 </a:extLst>
               </a:tr>
@@ -24444,7 +24417,7 @@
                 </a:tc>
                 <a:extLst>
                   <a:ext uri="{0D108BD9-81ED-4DB2-BD59-A6C34878D82A}">
-                    <a16:rowId xmlns:a16="http://schemas.microsoft.com/office/drawing/2014/main" xmlns="" val="3204002662"/>
+                    <a16:rowId xmlns="" xmlns:a16="http://schemas.microsoft.com/office/drawing/2014/main" val="3204002662"/>
                   </a:ext>
                 </a:extLst>
               </a:tr>
@@ -24481,7 +24454,7 @@
                 </a:tc>
                 <a:extLst>
                   <a:ext uri="{0D108BD9-81ED-4DB2-BD59-A6C34878D82A}">
-                    <a16:rowId xmlns:a16="http://schemas.microsoft.com/office/drawing/2014/main" xmlns="" val="4266278162"/>
+                    <a16:rowId xmlns="" xmlns:a16="http://schemas.microsoft.com/office/drawing/2014/main" val="4266278162"/>
                   </a:ext>
                 </a:extLst>
               </a:tr>
@@ -24514,17 +24487,8 @@
                       </a:r>
                       <a:r>
                         <a:rPr lang="en-US" sz="2400" dirty="0" smtClean="0"/>
-                        <a:t>Hook into Office </a:t>
+                        <a:t>Hook into Office 365 APIs</a:t>
                       </a:r>
-                      <a:r>
-                        <a:rPr lang="en-US" sz="2400" smtClean="0"/>
-                        <a:t>365 </a:t>
-                      </a:r>
-                      <a:r>
-                        <a:rPr lang="en-US" sz="2400" smtClean="0"/>
-                        <a:t>APIs</a:t>
-                      </a:r>
-                      <a:endParaRPr lang="en-US" sz="2400" dirty="0" smtClean="0"/>
                     </a:p>
                   </a:txBody>
                   <a:tcPr marL="91403" marR="91403" marT="45701" marB="45701" anchor="ctr"/>
@@ -28252,7 +28216,7 @@
               </a:ln>
               <a:extLst>
                 <a:ext uri="{91240B29-F687-4f45-9708-019B960494DF}">
-                  <a14:hiddenLine xmlns:a14="http://schemas.microsoft.com/office/drawing/2010/main" xmlns="" w="9525">
+                  <a14:hiddenLine xmlns="" xmlns:a14="http://schemas.microsoft.com/office/drawing/2010/main" w="9525">
                     <a:solidFill>
                       <a:srgbClr val="000000"/>
                     </a:solidFill>
@@ -28353,7 +28317,7 @@
               </a:ln>
               <a:extLst>
                 <a:ext uri="{91240B29-F687-4f45-9708-019B960494DF}">
-                  <a14:hiddenLine xmlns:a14="http://schemas.microsoft.com/office/drawing/2010/main" xmlns="" w="9525">
+                  <a14:hiddenLine xmlns="" xmlns:a14="http://schemas.microsoft.com/office/drawing/2010/main" w="9525">
                     <a:solidFill>
                       <a:srgbClr val="000000"/>
                     </a:solidFill>
@@ -35153,7 +35117,7 @@
               </a:ln>
               <a:extLst>
                 <a:ext uri="{91240B29-F687-4f45-9708-019B960494DF}">
-                  <a14:hiddenLine xmlns:a14="http://schemas.microsoft.com/office/drawing/2010/main" xmlns="" w="9525">
+                  <a14:hiddenLine xmlns="" xmlns:a14="http://schemas.microsoft.com/office/drawing/2010/main" w="9525">
                     <a:solidFill>
                       <a:srgbClr val="000000"/>
                     </a:solidFill>
@@ -35311,7 +35275,7 @@
               </a:ln>
               <a:extLst>
                 <a:ext uri="{91240B29-F687-4f45-9708-019B960494DF}">
-                  <a14:hiddenLine xmlns:a14="http://schemas.microsoft.com/office/drawing/2010/main" xmlns="" w="9525">
+                  <a14:hiddenLine xmlns="" xmlns:a14="http://schemas.microsoft.com/office/drawing/2010/main" w="9525">
                     <a:solidFill>
                       <a:srgbClr val="000000"/>
                     </a:solidFill>
@@ -35371,7 +35335,7 @@
               </a:ln>
               <a:extLst>
                 <a:ext uri="{91240B29-F687-4f45-9708-019B960494DF}">
-                  <a14:hiddenLine xmlns:a14="http://schemas.microsoft.com/office/drawing/2010/main" xmlns="" w="9525">
+                  <a14:hiddenLine xmlns="" xmlns:a14="http://schemas.microsoft.com/office/drawing/2010/main" w="9525">
                     <a:solidFill>
                       <a:srgbClr val="000000"/>
                     </a:solidFill>
@@ -35548,7 +35512,7 @@
               </a:ln>
               <a:extLst>
                 <a:ext uri="{91240B29-F687-4f45-9708-019B960494DF}">
-                  <a14:hiddenLine xmlns:a14="http://schemas.microsoft.com/office/drawing/2010/main" xmlns="" w="9525">
+                  <a14:hiddenLine xmlns="" xmlns:a14="http://schemas.microsoft.com/office/drawing/2010/main" w="9525">
                     <a:solidFill>
                       <a:srgbClr val="000000"/>
                     </a:solidFill>
@@ -37086,7 +37050,11 @@
           <a:p>
             <a:r>
               <a:rPr lang="en-US" sz="3100" b="0" dirty="0" smtClean="0"/>
-              <a:t>Module 4 – Hook into Office 365, SharePoint-Hosted Apps &amp; SPAs</a:t>
+              <a:t>Module 4 – Hook into Office </a:t>
+            </a:r>
+            <a:r>
+              <a:rPr lang="en-US" sz="3100" b="0" dirty="0" smtClean="0"/>
+              <a:t>365 APIs</a:t>
             </a:r>
             <a:endParaRPr lang="en-US" sz="3100" b="0" dirty="0"/>
           </a:p>
@@ -38152,8 +38120,13 @@
           <a:p>
             <a:r>
               <a:rPr lang="en-US" sz="4800" dirty="0"/>
-              <a:t>Module 4: Hook into Office 365 and SharePoint APIs with SPAs</a:t>
+              <a:t>Module 4: Hook into Office 365 </a:t>
             </a:r>
+            <a:r>
+              <a:rPr lang="en-US" sz="4800" dirty="0" smtClean="0"/>
+              <a:t>APIs</a:t>
+            </a:r>
+            <a:endParaRPr lang="en-US" sz="4800" dirty="0"/>
           </a:p>
         </p:txBody>
       </p:sp>
@@ -38177,8 +38150,9 @@
           <a:p>
             <a:r>
               <a:rPr lang="en-US" dirty="0" smtClean="0"/>
-              <a:t>Understand creating SharePoint-hosted apps</a:t>
+              <a:t>Understand Office 365 APIs</a:t>
             </a:r>
+            <a:endParaRPr lang="en-US" dirty="0" smtClean="0"/>
           </a:p>
           <a:p>
             <a:endParaRPr lang="en-US" dirty="0"/>
@@ -38186,21 +38160,11 @@
           <a:p>
             <a:r>
               <a:rPr lang="en-US" dirty="0" smtClean="0"/>
-              <a:t>Understand how to create single page applications (SPA) using </a:t>
+              <a:t>Understand how to create </a:t>
             </a:r>
             <a:r>
-              <a:rPr lang="en-US" dirty="0" err="1" smtClean="0"/>
-              <a:t>AngularJS</a:t>
-            </a:r>
-            <a:endParaRPr lang="en-US" dirty="0" smtClean="0"/>
-          </a:p>
-          <a:p>
-            <a:endParaRPr lang="en-US" dirty="0"/>
-          </a:p>
-          <a:p>
-            <a:r>
               <a:rPr lang="en-US" dirty="0" smtClean="0"/>
-              <a:t>Understand why and how to protect the OAuth2 access tokens with an intermediary</a:t>
+              <a:t>an ASP.NET MVC5 application that uses the Office 365 APIs</a:t>
             </a:r>
             <a:endParaRPr lang="en-US" dirty="0"/>
           </a:p>
@@ -39471,6 +39435,12 @@
 </file>
 
 <file path=customXml/item1.xml><?xml version="1.0" encoding="utf-8"?>
+<p:properties xmlns:p="http://schemas.microsoft.com/office/2006/metadata/properties" xmlns:xsi="http://www.w3.org/2001/XMLSchema-instance" xmlns:pc="http://schemas.microsoft.com/office/infopath/2007/PartnerControls">
+  <documentManagement/>
+</p:properties>
+</file>
+
+<file path=customXml/item2.xml><?xml version="1.0" encoding="utf-8"?>
 <ct:contentTypeSchema xmlns:ct="http://schemas.microsoft.com/office/2006/metadata/contentType" xmlns:ma="http://schemas.microsoft.com/office/2006/metadata/properties/metaAttributes" ct:_="" ma:_="" ma:contentTypeName="Document" ma:contentTypeID="0x010100A2E4C90AA7333249A7DBC8CC6F49919B" ma:contentTypeVersion="1" ma:contentTypeDescription="Create a new document." ma:contentTypeScope="" ma:versionID="e7b09f0f38d7ed30c7da14951e97abcc">
   <xsd:schema xmlns:xsd="http://www.w3.org/2001/XMLSchema" xmlns:xs="http://www.w3.org/2001/XMLSchema" xmlns:p="http://schemas.microsoft.com/office/2006/metadata/properties" xmlns:ns2="5fad15d0-477e-40da-a20d-40d4ca777cbd" targetNamespace="http://schemas.microsoft.com/office/2006/metadata/properties" ma:root="true" ma:fieldsID="0cee24db179c30c5ebec40b677cadf70" ns2:_="">
     <xsd:import namespace="5fad15d0-477e-40da-a20d-40d4ca777cbd"/>
@@ -39610,12 +39580,6 @@
 </ct:contentTypeSchema>
 </file>
 
-<file path=customXml/item2.xml><?xml version="1.0" encoding="utf-8"?>
-<p:properties xmlns:p="http://schemas.microsoft.com/office/2006/metadata/properties" xmlns:xsi="http://www.w3.org/2001/XMLSchema-instance" xmlns:pc="http://schemas.microsoft.com/office/infopath/2007/PartnerControls">
-  <documentManagement/>
-</p:properties>
-</file>
-
 <file path=customXml/item3.xml><?xml version="1.0" encoding="utf-8"?>
 <?mso-contentType ?>
 <FormTemplates xmlns="http://schemas.microsoft.com/sharepoint/v3/contenttype/forms">
@@ -39626,6 +39590,22 @@
 </file>
 
 <file path=customXml/itemProps1.xml><?xml version="1.0" encoding="utf-8"?>
+<ds:datastoreItem xmlns:ds="http://schemas.openxmlformats.org/officeDocument/2006/customXml" ds:itemID="{DA593625-DB14-4FB0-B5A9-3269FA9C120B}">
+  <ds:schemaRefs>
+    <ds:schemaRef ds:uri="http://purl.org/dc/elements/1.1/"/>
+    <ds:schemaRef ds:uri="http://schemas.microsoft.com/office/infopath/2007/PartnerControls"/>
+    <ds:schemaRef ds:uri="5fad15d0-477e-40da-a20d-40d4ca777cbd"/>
+    <ds:schemaRef ds:uri="http://purl.org/dc/terms/"/>
+    <ds:schemaRef ds:uri="http://schemas.microsoft.com/office/2006/metadata/properties"/>
+    <ds:schemaRef ds:uri="http://schemas.microsoft.com/office/2006/documentManagement/types"/>
+    <ds:schemaRef ds:uri="http://schemas.openxmlformats.org/package/2006/metadata/core-properties"/>
+    <ds:schemaRef ds:uri="http://purl.org/dc/dcmitype/"/>
+    <ds:schemaRef ds:uri="http://www.w3.org/XML/1998/namespace"/>
+  </ds:schemaRefs>
+</ds:datastoreItem>
+</file>
+
+<file path=customXml/itemProps2.xml><?xml version="1.0" encoding="utf-8"?>
 <ds:datastoreItem xmlns:ds="http://schemas.openxmlformats.org/officeDocument/2006/customXml" ds:itemID="{F17DCE38-6787-497B-B958-75817420EB1E}">
   <ds:schemaRefs>
     <ds:schemaRef ds:uri="http://schemas.microsoft.com/office/2006/metadata/contentType"/>
@@ -39643,22 +39623,6 @@
 </ds:datastoreItem>
 </file>
 
-<file path=customXml/itemProps2.xml><?xml version="1.0" encoding="utf-8"?>
-<ds:datastoreItem xmlns:ds="http://schemas.openxmlformats.org/officeDocument/2006/customXml" ds:itemID="{DA593625-DB14-4FB0-B5A9-3269FA9C120B}">
-  <ds:schemaRefs>
-    <ds:schemaRef ds:uri="http://schemas.microsoft.com/office/2006/documentManagement/types"/>
-    <ds:schemaRef ds:uri="http://purl.org/dc/elements/1.1/"/>
-    <ds:schemaRef ds:uri="http://schemas.microsoft.com/office/2006/metadata/properties"/>
-    <ds:schemaRef ds:uri="5fad15d0-477e-40da-a20d-40d4ca777cbd"/>
-    <ds:schemaRef ds:uri="http://www.w3.org/XML/1998/namespace"/>
-    <ds:schemaRef ds:uri="http://schemas.microsoft.com/office/infopath/2007/PartnerControls"/>
-    <ds:schemaRef ds:uri="http://purl.org/dc/dcmitype/"/>
-    <ds:schemaRef ds:uri="http://schemas.openxmlformats.org/package/2006/metadata/core-properties"/>
-    <ds:schemaRef ds:uri="http://purl.org/dc/terms/"/>
-  </ds:schemaRefs>
-</ds:datastoreItem>
-</file>
-
 <file path=customXml/itemProps3.xml><?xml version="1.0" encoding="utf-8"?>
 <ds:datastoreItem xmlns:ds="http://schemas.openxmlformats.org/officeDocument/2006/customXml" ds:itemID="{E1E0CE18-CA03-4891-9CD8-3448778E3D53}">
   <ds:schemaRefs>

</xml_diff>